<commit_message>
Add new Poster Idea
- Added Poster v2 that is more appealing and represents the topic in a better way,
- Added Logos .emf as vector graphics
</commit_message>
<xml_diff>
--- a/Poster/Poster.pptx
+++ b/Poster/Poster.pptx
@@ -104,6 +104,11 @@
       </a:defRPr>
     </a:lvl9pPr>
   </p:defaultTextStyle>
+  <p:extLst>
+    <p:ext uri="{EFAFB233-063F-42B5-8137-9DF3F51BA10A}">
+      <p15:sldGuideLst xmlns:p15="http://schemas.microsoft.com/office/powerpoint/2012/main"/>
+    </p:ext>
+  </p:extLst>
 </p:presentation>
 </file>
 
@@ -238,7 +243,7 @@
           <a:p>
             <a:fld id="{E4364EE5-A694-432C-AB68-46BEC34F4EB9}" type="datetimeFigureOut">
               <a:rPr lang="en-US" smtClean="0"/>
-              <a:t>5/28/2018</a:t>
+              <a:t>5/29/2018</a:t>
             </a:fld>
             <a:endParaRPr lang="en-US"/>
           </a:p>
@@ -408,7 +413,7 @@
           <a:p>
             <a:fld id="{E4364EE5-A694-432C-AB68-46BEC34F4EB9}" type="datetimeFigureOut">
               <a:rPr lang="en-US" smtClean="0"/>
-              <a:t>5/28/2018</a:t>
+              <a:t>5/29/2018</a:t>
             </a:fld>
             <a:endParaRPr lang="en-US"/>
           </a:p>
@@ -588,7 +593,7 @@
           <a:p>
             <a:fld id="{E4364EE5-A694-432C-AB68-46BEC34F4EB9}" type="datetimeFigureOut">
               <a:rPr lang="en-US" smtClean="0"/>
-              <a:t>5/28/2018</a:t>
+              <a:t>5/29/2018</a:t>
             </a:fld>
             <a:endParaRPr lang="en-US"/>
           </a:p>
@@ -758,7 +763,7 @@
           <a:p>
             <a:fld id="{E4364EE5-A694-432C-AB68-46BEC34F4EB9}" type="datetimeFigureOut">
               <a:rPr lang="en-US" smtClean="0"/>
-              <a:t>5/28/2018</a:t>
+              <a:t>5/29/2018</a:t>
             </a:fld>
             <a:endParaRPr lang="en-US"/>
           </a:p>
@@ -1002,7 +1007,7 @@
           <a:p>
             <a:fld id="{E4364EE5-A694-432C-AB68-46BEC34F4EB9}" type="datetimeFigureOut">
               <a:rPr lang="en-US" smtClean="0"/>
-              <a:t>5/28/2018</a:t>
+              <a:t>5/29/2018</a:t>
             </a:fld>
             <a:endParaRPr lang="en-US"/>
           </a:p>
@@ -1234,7 +1239,7 @@
           <a:p>
             <a:fld id="{E4364EE5-A694-432C-AB68-46BEC34F4EB9}" type="datetimeFigureOut">
               <a:rPr lang="en-US" smtClean="0"/>
-              <a:t>5/28/2018</a:t>
+              <a:t>5/29/2018</a:t>
             </a:fld>
             <a:endParaRPr lang="en-US"/>
           </a:p>
@@ -1601,7 +1606,7 @@
           <a:p>
             <a:fld id="{E4364EE5-A694-432C-AB68-46BEC34F4EB9}" type="datetimeFigureOut">
               <a:rPr lang="en-US" smtClean="0"/>
-              <a:t>5/28/2018</a:t>
+              <a:t>5/29/2018</a:t>
             </a:fld>
             <a:endParaRPr lang="en-US"/>
           </a:p>
@@ -1719,7 +1724,7 @@
           <a:p>
             <a:fld id="{E4364EE5-A694-432C-AB68-46BEC34F4EB9}" type="datetimeFigureOut">
               <a:rPr lang="en-US" smtClean="0"/>
-              <a:t>5/28/2018</a:t>
+              <a:t>5/29/2018</a:t>
             </a:fld>
             <a:endParaRPr lang="en-US"/>
           </a:p>
@@ -1814,7 +1819,7 @@
           <a:p>
             <a:fld id="{E4364EE5-A694-432C-AB68-46BEC34F4EB9}" type="datetimeFigureOut">
               <a:rPr lang="en-US" smtClean="0"/>
-              <a:t>5/28/2018</a:t>
+              <a:t>5/29/2018</a:t>
             </a:fld>
             <a:endParaRPr lang="en-US"/>
           </a:p>
@@ -2091,7 +2096,7 @@
           <a:p>
             <a:fld id="{E4364EE5-A694-432C-AB68-46BEC34F4EB9}" type="datetimeFigureOut">
               <a:rPr lang="en-US" smtClean="0"/>
-              <a:t>5/28/2018</a:t>
+              <a:t>5/29/2018</a:t>
             </a:fld>
             <a:endParaRPr lang="en-US"/>
           </a:p>
@@ -2348,7 +2353,7 @@
           <a:p>
             <a:fld id="{E4364EE5-A694-432C-AB68-46BEC34F4EB9}" type="datetimeFigureOut">
               <a:rPr lang="en-US" smtClean="0"/>
-              <a:t>5/28/2018</a:t>
+              <a:t>5/29/2018</a:t>
             </a:fld>
             <a:endParaRPr lang="en-US"/>
           </a:p>
@@ -2561,7 +2566,7 @@
           <a:p>
             <a:fld id="{E4364EE5-A694-432C-AB68-46BEC34F4EB9}" type="datetimeFigureOut">
               <a:rPr lang="en-US" smtClean="0"/>
-              <a:t>5/28/2018</a:t>
+              <a:t>5/29/2018</a:t>
             </a:fld>
             <a:endParaRPr lang="en-US"/>
           </a:p>
@@ -2952,6 +2957,14 @@
 <file path=ppt/slides/slide1.xml><?xml version="1.0" encoding="utf-8"?>
 <p:sld xmlns:a="http://schemas.openxmlformats.org/drawingml/2006/main" xmlns:r="http://schemas.openxmlformats.org/officeDocument/2006/relationships" xmlns:p="http://schemas.openxmlformats.org/presentationml/2006/main">
   <p:cSld>
+    <p:bg>
+      <p:bgPr>
+        <a:solidFill>
+          <a:schemeClr val="bg1"/>
+        </a:solidFill>
+        <a:effectLst/>
+      </p:bgPr>
+    </p:bg>
     <p:spTree>
       <p:nvGrpSpPr>
         <p:cNvPr id="1" name=""/>
@@ -2968,13 +2981,317 @@
       </p:grpSpPr>
       <p:sp>
         <p:nvSpPr>
+          <p:cNvPr id="96" name="TextBox 95"/>
+          <p:cNvSpPr txBox="1"/>
+          <p:nvPr/>
+        </p:nvSpPr>
+        <p:spPr>
+          <a:xfrm>
+            <a:off x="7001003" y="11663937"/>
+            <a:ext cx="2176272" cy="356616"/>
+          </a:xfrm>
+          <a:prstGeom prst="rect">
+            <a:avLst/>
+          </a:prstGeom>
+          <a:noFill/>
+        </p:spPr>
+        <p:txBody>
+          <a:bodyPr wrap="square" rtlCol="0" anchor="ctr">
+            <a:spAutoFit/>
+          </a:bodyPr>
+          <a:lstStyle/>
+          <a:p>
+            <a:pPr algn="ctr"/>
+            <a:r>
+              <a:rPr lang="de-DE" sz="1050" dirty="0" smtClean="0"/>
+              <a:t>Seit 2018</a:t>
+            </a:r>
+          </a:p>
+        </p:txBody>
+      </p:sp>
+      <p:sp>
+        <p:nvSpPr>
+          <p:cNvPr id="95" name="TextBox 94"/>
+          <p:cNvSpPr txBox="1"/>
+          <p:nvPr/>
+        </p:nvSpPr>
+        <p:spPr>
+          <a:xfrm>
+            <a:off x="4830597" y="11661235"/>
+            <a:ext cx="2167128" cy="356616"/>
+          </a:xfrm>
+          <a:prstGeom prst="rect">
+            <a:avLst/>
+          </a:prstGeom>
+          <a:noFill/>
+        </p:spPr>
+        <p:txBody>
+          <a:bodyPr wrap="square" rtlCol="0" anchor="ctr">
+            <a:spAutoFit/>
+          </a:bodyPr>
+          <a:lstStyle/>
+          <a:p>
+            <a:pPr algn="ctr"/>
+            <a:r>
+              <a:rPr lang="de-DE" sz="1050" dirty="0" smtClean="0"/>
+              <a:t>Seit 2013 </a:t>
+            </a:r>
+          </a:p>
+        </p:txBody>
+      </p:sp>
+      <p:sp>
+        <p:nvSpPr>
+          <p:cNvPr id="93" name="TextBox 92"/>
+          <p:cNvSpPr txBox="1"/>
+          <p:nvPr/>
+        </p:nvSpPr>
+        <p:spPr>
+          <a:xfrm>
+            <a:off x="2660516" y="11656952"/>
+            <a:ext cx="2167128" cy="356616"/>
+          </a:xfrm>
+          <a:prstGeom prst="rect">
+            <a:avLst/>
+          </a:prstGeom>
+          <a:noFill/>
+        </p:spPr>
+        <p:txBody>
+          <a:bodyPr wrap="square" rtlCol="0" anchor="ctr">
+            <a:spAutoFit/>
+          </a:bodyPr>
+          <a:lstStyle/>
+          <a:p>
+            <a:pPr algn="ctr"/>
+            <a:r>
+              <a:rPr lang="de-DE" sz="1050" dirty="0" smtClean="0"/>
+              <a:t>Seit 2008</a:t>
+            </a:r>
+          </a:p>
+        </p:txBody>
+      </p:sp>
+      <p:sp>
+        <p:nvSpPr>
+          <p:cNvPr id="53" name="TextBox 52"/>
+          <p:cNvSpPr txBox="1"/>
+          <p:nvPr/>
+        </p:nvSpPr>
+        <p:spPr>
+          <a:xfrm>
+            <a:off x="481291" y="11663937"/>
+            <a:ext cx="2176272" cy="365760"/>
+          </a:xfrm>
+          <a:prstGeom prst="rect">
+            <a:avLst/>
+          </a:prstGeom>
+          <a:noFill/>
+        </p:spPr>
+        <p:txBody>
+          <a:bodyPr wrap="square" rtlCol="0" anchor="ctr">
+            <a:spAutoFit/>
+          </a:bodyPr>
+          <a:lstStyle/>
+          <a:p>
+            <a:pPr algn="ctr"/>
+            <a:r>
+              <a:rPr lang="de-DE" sz="1050" dirty="0" smtClean="0"/>
+              <a:t>Seit 1982</a:t>
+            </a:r>
+          </a:p>
+        </p:txBody>
+      </p:sp>
+      <p:sp>
+        <p:nvSpPr>
+          <p:cNvPr id="141" name="Rectangle 140"/>
+          <p:cNvSpPr/>
+          <p:nvPr/>
+        </p:nvSpPr>
+        <p:spPr>
+          <a:xfrm>
+            <a:off x="329044" y="6657007"/>
+            <a:ext cx="3207227" cy="1265733"/>
+          </a:xfrm>
+          <a:prstGeom prst="rect">
+            <a:avLst/>
+          </a:prstGeom>
+          <a:noFill/>
+          <a:ln w="28575">
+            <a:solidFill>
+              <a:srgbClr val="004A8C"/>
+            </a:solidFill>
+          </a:ln>
+        </p:spPr>
+        <p:style>
+          <a:lnRef idx="2">
+            <a:schemeClr val="accent1">
+              <a:shade val="50000"/>
+            </a:schemeClr>
+          </a:lnRef>
+          <a:fillRef idx="1">
+            <a:schemeClr val="accent1"/>
+          </a:fillRef>
+          <a:effectRef idx="0">
+            <a:schemeClr val="accent1"/>
+          </a:effectRef>
+          <a:fontRef idx="minor">
+            <a:schemeClr val="lt1"/>
+          </a:fontRef>
+        </p:style>
+        <p:txBody>
+          <a:bodyPr rtlCol="0" anchor="ctr"/>
+          <a:lstStyle/>
+          <a:p>
+            <a:pPr algn="ctr"/>
+            <a:endParaRPr lang="en-US"/>
+          </a:p>
+        </p:txBody>
+      </p:sp>
+      <p:sp>
+        <p:nvSpPr>
+          <p:cNvPr id="119" name="Rectangle 118"/>
+          <p:cNvSpPr/>
+          <p:nvPr/>
+        </p:nvSpPr>
+        <p:spPr>
+          <a:xfrm>
+            <a:off x="5974221" y="6645563"/>
+            <a:ext cx="3158348" cy="2958938"/>
+          </a:xfrm>
+          <a:prstGeom prst="rect">
+            <a:avLst/>
+          </a:prstGeom>
+          <a:noFill/>
+          <a:ln w="28575">
+            <a:solidFill>
+              <a:srgbClr val="004A8C"/>
+            </a:solidFill>
+          </a:ln>
+        </p:spPr>
+        <p:style>
+          <a:lnRef idx="2">
+            <a:schemeClr val="accent1">
+              <a:shade val="50000"/>
+            </a:schemeClr>
+          </a:lnRef>
+          <a:fillRef idx="1">
+            <a:schemeClr val="accent1"/>
+          </a:fillRef>
+          <a:effectRef idx="0">
+            <a:schemeClr val="accent1"/>
+          </a:effectRef>
+          <a:fontRef idx="minor">
+            <a:schemeClr val="lt1"/>
+          </a:fontRef>
+        </p:style>
+        <p:txBody>
+          <a:bodyPr rtlCol="0" anchor="ctr"/>
+          <a:lstStyle/>
+          <a:p>
+            <a:pPr algn="ctr"/>
+            <a:endParaRPr lang="en-US"/>
+          </a:p>
+        </p:txBody>
+      </p:sp>
+      <p:sp>
+        <p:nvSpPr>
+          <p:cNvPr id="75" name="Rectangle 74"/>
+          <p:cNvSpPr/>
+          <p:nvPr/>
+        </p:nvSpPr>
+        <p:spPr>
+          <a:xfrm>
+            <a:off x="3061913" y="9070194"/>
+            <a:ext cx="2303681" cy="2385848"/>
+          </a:xfrm>
+          <a:prstGeom prst="rect">
+            <a:avLst/>
+          </a:prstGeom>
+          <a:noFill/>
+          <a:ln w="28575">
+            <a:solidFill>
+              <a:srgbClr val="004A8C"/>
+            </a:solidFill>
+          </a:ln>
+        </p:spPr>
+        <p:style>
+          <a:lnRef idx="2">
+            <a:schemeClr val="accent1">
+              <a:shade val="50000"/>
+            </a:schemeClr>
+          </a:lnRef>
+          <a:fillRef idx="1">
+            <a:schemeClr val="accent1"/>
+          </a:fillRef>
+          <a:effectRef idx="0">
+            <a:schemeClr val="accent1"/>
+          </a:effectRef>
+          <a:fontRef idx="minor">
+            <a:schemeClr val="lt1"/>
+          </a:fontRef>
+        </p:style>
+        <p:txBody>
+          <a:bodyPr rtlCol="0" anchor="ctr"/>
+          <a:lstStyle/>
+          <a:p>
+            <a:pPr algn="ctr"/>
+            <a:endParaRPr lang="en-US"/>
+          </a:p>
+        </p:txBody>
+      </p:sp>
+      <p:sp>
+        <p:nvSpPr>
+          <p:cNvPr id="114" name="Rectangle 113"/>
+          <p:cNvSpPr/>
+          <p:nvPr/>
+        </p:nvSpPr>
+        <p:spPr>
+          <a:xfrm>
+            <a:off x="2326883" y="2952224"/>
+            <a:ext cx="2976866" cy="3311541"/>
+          </a:xfrm>
+          <a:prstGeom prst="rect">
+            <a:avLst/>
+          </a:prstGeom>
+          <a:noFill/>
+          <a:ln w="28575">
+            <a:solidFill>
+              <a:srgbClr val="004A8C"/>
+            </a:solidFill>
+          </a:ln>
+        </p:spPr>
+        <p:style>
+          <a:lnRef idx="2">
+            <a:schemeClr val="accent1">
+              <a:shade val="50000"/>
+            </a:schemeClr>
+          </a:lnRef>
+          <a:fillRef idx="1">
+            <a:schemeClr val="accent1"/>
+          </a:fillRef>
+          <a:effectRef idx="0">
+            <a:schemeClr val="accent1"/>
+          </a:effectRef>
+          <a:fontRef idx="minor">
+            <a:schemeClr val="lt1"/>
+          </a:fontRef>
+        </p:style>
+        <p:txBody>
+          <a:bodyPr rtlCol="0" anchor="ctr"/>
+          <a:lstStyle/>
+          <a:p>
+            <a:pPr algn="ctr"/>
+            <a:endParaRPr lang="en-US"/>
+          </a:p>
+        </p:txBody>
+      </p:sp>
+      <p:sp>
+        <p:nvSpPr>
           <p:cNvPr id="4" name="TextBox 3"/>
           <p:cNvSpPr txBox="1"/>
           <p:nvPr/>
         </p:nvSpPr>
         <p:spPr>
           <a:xfrm>
-            <a:off x="365760" y="365760"/>
+            <a:off x="365760" y="323720"/>
             <a:ext cx="8891752" cy="1938992"/>
           </a:xfrm>
           <a:prstGeom prst="rect">
@@ -3013,8 +3330,8 @@
         </p:nvCxnSpPr>
         <p:spPr>
           <a:xfrm>
-            <a:off x="483476" y="2578021"/>
-            <a:ext cx="8586952" cy="0"/>
+            <a:off x="486630" y="2662115"/>
+            <a:ext cx="8686800" cy="0"/>
           </a:xfrm>
           <a:prstGeom prst="line">
             <a:avLst/>
@@ -3048,8 +3365,8 @@
         </p:nvCxnSpPr>
         <p:spPr>
           <a:xfrm>
-            <a:off x="484632" y="12011056"/>
-            <a:ext cx="8586952" cy="0"/>
+            <a:off x="488431" y="12017851"/>
+            <a:ext cx="8686800" cy="0"/>
           </a:xfrm>
           <a:prstGeom prst="line">
             <a:avLst/>
@@ -3083,8 +3400,8 @@
         </p:nvSpPr>
         <p:spPr>
           <a:xfrm>
-            <a:off x="365760" y="12163945"/>
-            <a:ext cx="1904474" cy="457200"/>
+            <a:off x="365760" y="12218392"/>
+            <a:ext cx="1904474" cy="438912"/>
           </a:xfrm>
           <a:prstGeom prst="rect">
             <a:avLst/>
@@ -3092,7 +3409,7 @@
           <a:noFill/>
         </p:spPr>
         <p:txBody>
-          <a:bodyPr wrap="square" rtlCol="0">
+          <a:bodyPr wrap="square" rtlCol="0" anchor="ctr">
             <a:spAutoFit/>
           </a:bodyPr>
           <a:lstStyle/>
@@ -3169,8 +3486,8 @@
         </p:blipFill>
         <p:spPr bwMode="auto">
           <a:xfrm>
-            <a:off x="5452767" y="12155702"/>
-            <a:ext cx="1771096" cy="539200"/>
+            <a:off x="5789094" y="12218762"/>
+            <a:ext cx="1441683" cy="438912"/>
           </a:xfrm>
           <a:prstGeom prst="rect">
             <a:avLst/>
@@ -3209,7 +3526,7 @@
         </p:blipFill>
         <p:spPr>
           <a:xfrm>
-            <a:off x="6260974" y="6938591"/>
+            <a:off x="2552662" y="3045228"/>
             <a:ext cx="2525309" cy="2118103"/>
           </a:xfrm>
           <a:prstGeom prst="rect">
@@ -3225,8 +3542,8 @@
         </p:nvCxnSpPr>
         <p:spPr>
           <a:xfrm flipV="1">
-            <a:off x="1022657" y="3444202"/>
-            <a:ext cx="7577958" cy="7630511"/>
+            <a:off x="879574" y="3364399"/>
+            <a:ext cx="7763626" cy="7773027"/>
           </a:xfrm>
           <a:prstGeom prst="line">
             <a:avLst/>
@@ -3253,72 +3570,6 @@
           </a:fontRef>
         </p:style>
       </p:cxnSp>
-      <p:cxnSp>
-        <p:nvCxnSpPr>
-          <p:cNvPr id="28" name="Straight Arrow Connector 27"/>
-          <p:cNvCxnSpPr/>
-          <p:nvPr/>
-        </p:nvCxnSpPr>
-        <p:spPr>
-          <a:xfrm>
-            <a:off x="483476" y="11561379"/>
-            <a:ext cx="8586952" cy="0"/>
-          </a:xfrm>
-          <a:prstGeom prst="straightConnector1">
-            <a:avLst/>
-          </a:prstGeom>
-          <a:ln>
-            <a:solidFill>
-              <a:srgbClr val="004A8C"/>
-            </a:solidFill>
-            <a:tailEnd type="triangle"/>
-          </a:ln>
-        </p:spPr>
-        <p:style>
-          <a:lnRef idx="1">
-            <a:schemeClr val="accent1"/>
-          </a:lnRef>
-          <a:fillRef idx="0">
-            <a:schemeClr val="accent1"/>
-          </a:fillRef>
-          <a:effectRef idx="0">
-            <a:schemeClr val="accent1"/>
-          </a:effectRef>
-          <a:fontRef idx="minor">
-            <a:schemeClr val="tx1"/>
-          </a:fontRef>
-        </p:style>
-      </p:cxnSp>
-      <p:sp>
-        <p:nvSpPr>
-          <p:cNvPr id="1024" name="TextBox 1023"/>
-          <p:cNvSpPr txBox="1"/>
-          <p:nvPr/>
-        </p:nvSpPr>
-        <p:spPr>
-          <a:xfrm>
-            <a:off x="1022657" y="11618359"/>
-            <a:ext cx="1120402" cy="338554"/>
-          </a:xfrm>
-          <a:prstGeom prst="rect">
-            <a:avLst/>
-          </a:prstGeom>
-          <a:noFill/>
-        </p:spPr>
-        <p:txBody>
-          <a:bodyPr wrap="square" rtlCol="0" anchor="ctr">
-            <a:spAutoFit/>
-          </a:bodyPr>
-          <a:lstStyle/>
-          <a:p>
-            <a:pPr algn="ctr"/>
-            <a:r>
-              <a:rPr lang="de-DE" sz="1600" dirty="0" smtClean="0"/>
-              <a:t>vor 2002</a:t>
-            </a:r>
-          </a:p>
-        </p:txBody>
-      </p:sp>
       <p:sp>
         <p:nvSpPr>
           <p:cNvPr id="1040" name="Oval 1039"/>
@@ -3327,8 +3578,8 @@
         </p:nvSpPr>
         <p:spPr>
           <a:xfrm>
-            <a:off x="1496964" y="10409011"/>
-            <a:ext cx="200165" cy="185416"/>
+            <a:off x="1437967" y="10419168"/>
+            <a:ext cx="182880" cy="182880"/>
           </a:xfrm>
           <a:prstGeom prst="ellipse">
             <a:avLst/>
@@ -3373,7 +3624,7 @@
         </p:nvSpPr>
         <p:spPr>
           <a:xfrm>
-            <a:off x="2411831" y="10398557"/>
+            <a:off x="416481" y="6961207"/>
             <a:ext cx="1345325" cy="584775"/>
           </a:xfrm>
           <a:prstGeom prst="rect">
@@ -3415,7 +3666,7 @@
         </p:blipFill>
         <p:spPr bwMode="auto">
           <a:xfrm>
-            <a:off x="6071572" y="9141494"/>
+            <a:off x="2363260" y="5248131"/>
             <a:ext cx="924911" cy="861850"/>
           </a:xfrm>
           <a:prstGeom prst="rect">
@@ -3441,8 +3692,8 @@
         </p:nvSpPr>
         <p:spPr>
           <a:xfrm>
-            <a:off x="3727843" y="8159165"/>
-            <a:ext cx="200165" cy="185416"/>
+            <a:off x="3584760" y="8253407"/>
+            <a:ext cx="182880" cy="185416"/>
           </a:xfrm>
           <a:prstGeom prst="ellipse">
             <a:avLst/>
@@ -3479,56 +3730,26 @@
           </a:p>
         </p:txBody>
       </p:sp>
-      <p:sp>
-        <p:nvSpPr>
-          <p:cNvPr id="65" name="TextBox 64"/>
-          <p:cNvSpPr txBox="1"/>
-          <p:nvPr/>
-        </p:nvSpPr>
-        <p:spPr>
-          <a:xfrm>
-            <a:off x="3306171" y="11613914"/>
-            <a:ext cx="1349720" cy="338554"/>
-          </a:xfrm>
-          <a:prstGeom prst="rect">
-            <a:avLst/>
-          </a:prstGeom>
-          <a:noFill/>
-        </p:spPr>
-        <p:txBody>
-          <a:bodyPr wrap="square" rtlCol="0" anchor="ctr">
-            <a:spAutoFit/>
-          </a:bodyPr>
-          <a:lstStyle/>
-          <a:p>
-            <a:pPr algn="ctr"/>
-            <a:r>
-              <a:rPr lang="de-DE" sz="1600" dirty="0" smtClean="0"/>
-              <a:t>2002 - 2007</a:t>
-            </a:r>
-          </a:p>
-        </p:txBody>
-      </p:sp>
       <p:cxnSp>
         <p:nvCxnSpPr>
           <p:cNvPr id="66" name="Straight Connector 65"/>
           <p:cNvCxnSpPr>
-            <a:stCxn id="64" idx="1"/>
-            <a:endCxn id="75" idx="2"/>
+            <a:stCxn id="64" idx="5"/>
+            <a:endCxn id="75" idx="0"/>
           </p:cNvCxnSpPr>
           <p:nvPr/>
         </p:nvCxnSpPr>
         <p:spPr>
-          <a:xfrm flipH="1" flipV="1">
-            <a:off x="2143059" y="7749421"/>
-            <a:ext cx="1614097" cy="436898"/>
+          <a:xfrm>
+            <a:off x="3740858" y="8411669"/>
+            <a:ext cx="472896" cy="658525"/>
           </a:xfrm>
           <a:prstGeom prst="line">
             <a:avLst/>
           </a:prstGeom>
-          <a:ln w="19050">
+          <a:ln w="19050" cmpd="sng">
             <a:solidFill>
-              <a:srgbClr val="929395"/>
+              <a:srgbClr val="004A8C"/>
             </a:solidFill>
           </a:ln>
         </p:spPr>
@@ -3549,44 +3770,14 @@
       </p:cxnSp>
       <p:sp>
         <p:nvSpPr>
-          <p:cNvPr id="78" name="TextBox 77"/>
-          <p:cNvSpPr txBox="1"/>
-          <p:nvPr/>
-        </p:nvSpPr>
-        <p:spPr>
-          <a:xfrm>
-            <a:off x="5819003" y="11622281"/>
-            <a:ext cx="985815" cy="338554"/>
-          </a:xfrm>
-          <a:prstGeom prst="rect">
-            <a:avLst/>
-          </a:prstGeom>
-          <a:noFill/>
-        </p:spPr>
-        <p:txBody>
-          <a:bodyPr wrap="square" rtlCol="0" anchor="ctr">
-            <a:spAutoFit/>
-          </a:bodyPr>
-          <a:lstStyle/>
-          <a:p>
-            <a:pPr algn="ctr"/>
-            <a:r>
-              <a:rPr lang="de-DE" sz="1600" dirty="0" smtClean="0"/>
-              <a:t>2013</a:t>
-            </a:r>
-          </a:p>
-        </p:txBody>
-      </p:sp>
-      <p:sp>
-        <p:nvSpPr>
           <p:cNvPr id="79" name="Oval 78"/>
           <p:cNvSpPr/>
           <p:nvPr/>
         </p:nvSpPr>
         <p:spPr>
           <a:xfrm>
-            <a:off x="5885609" y="6021952"/>
-            <a:ext cx="200165" cy="185416"/>
+            <a:off x="5742526" y="6084664"/>
+            <a:ext cx="182880" cy="185416"/>
           </a:xfrm>
           <a:prstGeom prst="ellipse">
             <a:avLst/>
@@ -3627,22 +3818,22 @@
         <p:nvCxnSpPr>
           <p:cNvPr id="82" name="Straight Connector 81"/>
           <p:cNvCxnSpPr>
-            <a:stCxn id="79" idx="5"/>
-            <a:endCxn id="114" idx="0"/>
+            <a:stCxn id="79" idx="0"/>
+            <a:endCxn id="114" idx="3"/>
           </p:cNvCxnSpPr>
           <p:nvPr/>
         </p:nvCxnSpPr>
         <p:spPr>
-          <a:xfrm>
-            <a:off x="6056461" y="6180214"/>
-            <a:ext cx="1467167" cy="665373"/>
+          <a:xfrm flipH="1" flipV="1">
+            <a:off x="5303749" y="4607995"/>
+            <a:ext cx="530217" cy="1476669"/>
           </a:xfrm>
           <a:prstGeom prst="line">
             <a:avLst/>
           </a:prstGeom>
-          <a:ln w="19050">
+          <a:ln w="19050" cmpd="sng">
             <a:solidFill>
-              <a:srgbClr val="929395"/>
+              <a:srgbClr val="004A8C"/>
             </a:solidFill>
           </a:ln>
         </p:spPr>
@@ -3663,44 +3854,14 @@
       </p:cxnSp>
       <p:sp>
         <p:nvSpPr>
-          <p:cNvPr id="88" name="TextBox 87"/>
-          <p:cNvSpPr txBox="1"/>
-          <p:nvPr/>
-        </p:nvSpPr>
-        <p:spPr>
-          <a:xfrm>
-            <a:off x="7697357" y="11614358"/>
-            <a:ext cx="1017863" cy="338554"/>
-          </a:xfrm>
-          <a:prstGeom prst="rect">
-            <a:avLst/>
-          </a:prstGeom>
-          <a:noFill/>
-        </p:spPr>
-        <p:txBody>
-          <a:bodyPr wrap="square" rtlCol="0" anchor="ctr">
-            <a:spAutoFit/>
-          </a:bodyPr>
-          <a:lstStyle/>
-          <a:p>
-            <a:pPr algn="ctr"/>
-            <a:r>
-              <a:rPr lang="de-DE" sz="1600" dirty="0" smtClean="0"/>
-              <a:t>2018</a:t>
-            </a:r>
-          </a:p>
-        </p:txBody>
-      </p:sp>
-      <p:sp>
-        <p:nvSpPr>
           <p:cNvPr id="89" name="Oval 88"/>
           <p:cNvSpPr/>
           <p:nvPr/>
         </p:nvSpPr>
         <p:spPr>
           <a:xfrm>
-            <a:off x="8106207" y="3756459"/>
-            <a:ext cx="200165" cy="185416"/>
+            <a:off x="7963124" y="3882231"/>
+            <a:ext cx="182880" cy="185416"/>
           </a:xfrm>
           <a:prstGeom prst="ellipse">
             <a:avLst/>
@@ -3760,7 +3921,7 @@
         </p:blipFill>
         <p:spPr bwMode="auto">
           <a:xfrm>
-            <a:off x="1211935" y="5586596"/>
+            <a:off x="3282630" y="9293217"/>
             <a:ext cx="645145" cy="714183"/>
           </a:xfrm>
           <a:prstGeom prst="rect">
@@ -3800,7 +3961,7 @@
         </p:blipFill>
         <p:spPr>
           <a:xfrm>
-            <a:off x="2115648" y="5469464"/>
+            <a:off x="4186343" y="9176085"/>
             <a:ext cx="967372" cy="967372"/>
           </a:xfrm>
           <a:prstGeom prst="rect">
@@ -3831,7 +3992,7 @@
         </p:blipFill>
         <p:spPr bwMode="auto">
           <a:xfrm>
-            <a:off x="1209673" y="6466211"/>
+            <a:off x="3280368" y="10172832"/>
             <a:ext cx="1789020" cy="1201625"/>
           </a:xfrm>
           <a:prstGeom prst="rect">
@@ -3871,12 +4032,13 @@
         </p:blipFill>
         <p:spPr>
           <a:xfrm>
-            <a:off x="4559363" y="2986821"/>
-            <a:ext cx="1026769" cy="995452"/>
+            <a:off x="6720508" y="6773509"/>
+            <a:ext cx="1686393" cy="1634957"/>
           </a:xfrm>
           <a:prstGeom prst="rect">
             <a:avLst/>
           </a:prstGeom>
+          <a:effectLst/>
         </p:spPr>
       </p:pic>
       <p:pic>
@@ -3902,7 +4064,7 @@
         </p:blipFill>
         <p:spPr bwMode="auto">
           <a:xfrm>
-            <a:off x="5544580" y="4000685"/>
+            <a:off x="7121118" y="8414619"/>
             <a:ext cx="1023761" cy="1023761"/>
           </a:xfrm>
           <a:prstGeom prst="rect">
@@ -3920,98 +4082,6 @@
           </a:extLst>
         </p:spPr>
       </p:pic>
-      <p:sp>
-        <p:nvSpPr>
-          <p:cNvPr id="75" name="Rectangle 74"/>
-          <p:cNvSpPr/>
-          <p:nvPr/>
-        </p:nvSpPr>
-        <p:spPr>
-          <a:xfrm>
-            <a:off x="991218" y="5363573"/>
-            <a:ext cx="2303681" cy="2385848"/>
-          </a:xfrm>
-          <a:prstGeom prst="rect">
-            <a:avLst/>
-          </a:prstGeom>
-          <a:noFill/>
-          <a:ln w="15875">
-            <a:solidFill>
-              <a:srgbClr val="929395"/>
-            </a:solidFill>
-          </a:ln>
-        </p:spPr>
-        <p:style>
-          <a:lnRef idx="2">
-            <a:schemeClr val="accent1">
-              <a:shade val="50000"/>
-            </a:schemeClr>
-          </a:lnRef>
-          <a:fillRef idx="1">
-            <a:schemeClr val="accent1"/>
-          </a:fillRef>
-          <a:effectRef idx="0">
-            <a:schemeClr val="accent1"/>
-          </a:effectRef>
-          <a:fontRef idx="minor">
-            <a:schemeClr val="lt1"/>
-          </a:fontRef>
-        </p:style>
-        <p:txBody>
-          <a:bodyPr rtlCol="0" anchor="ctr"/>
-          <a:lstStyle/>
-          <a:p>
-            <a:pPr algn="ctr"/>
-            <a:endParaRPr lang="en-US"/>
-          </a:p>
-        </p:txBody>
-      </p:sp>
-      <p:sp>
-        <p:nvSpPr>
-          <p:cNvPr id="114" name="Rectangle 113"/>
-          <p:cNvSpPr/>
-          <p:nvPr/>
-        </p:nvSpPr>
-        <p:spPr>
-          <a:xfrm>
-            <a:off x="6035195" y="6845587"/>
-            <a:ext cx="2976866" cy="3311541"/>
-          </a:xfrm>
-          <a:prstGeom prst="rect">
-            <a:avLst/>
-          </a:prstGeom>
-          <a:noFill/>
-          <a:ln w="15875">
-            <a:solidFill>
-              <a:srgbClr val="929395"/>
-            </a:solidFill>
-          </a:ln>
-        </p:spPr>
-        <p:style>
-          <a:lnRef idx="2">
-            <a:schemeClr val="accent1">
-              <a:shade val="50000"/>
-            </a:schemeClr>
-          </a:lnRef>
-          <a:fillRef idx="1">
-            <a:schemeClr val="accent1"/>
-          </a:fillRef>
-          <a:effectRef idx="0">
-            <a:schemeClr val="accent1"/>
-          </a:effectRef>
-          <a:fontRef idx="minor">
-            <a:schemeClr val="lt1"/>
-          </a:fontRef>
-        </p:style>
-        <p:txBody>
-          <a:bodyPr rtlCol="0" anchor="ctr"/>
-          <a:lstStyle/>
-          <a:p>
-            <a:pPr algn="ctr"/>
-            <a:endParaRPr lang="en-US"/>
-          </a:p>
-        </p:txBody>
-      </p:sp>
       <p:pic>
         <p:nvPicPr>
           <p:cNvPr id="83" name="Picture 82"/>
@@ -4034,7 +4104,7 @@
         </p:blipFill>
         <p:spPr>
           <a:xfrm>
-            <a:off x="7257776" y="9236569"/>
+            <a:off x="3549464" y="5343206"/>
             <a:ext cx="1528507" cy="641973"/>
           </a:xfrm>
           <a:prstGeom prst="rect">
@@ -4042,72 +4112,26 @@
           </a:prstGeom>
         </p:spPr>
       </p:pic>
-      <p:sp>
-        <p:nvSpPr>
-          <p:cNvPr id="119" name="Rectangle 118"/>
-          <p:cNvSpPr/>
-          <p:nvPr/>
-        </p:nvSpPr>
-        <p:spPr>
-          <a:xfrm>
-            <a:off x="4445693" y="2947784"/>
-            <a:ext cx="2249398" cy="2253724"/>
-          </a:xfrm>
-          <a:prstGeom prst="rect">
-            <a:avLst/>
-          </a:prstGeom>
-          <a:noFill/>
-          <a:ln w="15875">
-            <a:solidFill>
-              <a:srgbClr val="929395"/>
-            </a:solidFill>
-          </a:ln>
-        </p:spPr>
-        <p:style>
-          <a:lnRef idx="2">
-            <a:schemeClr val="accent1">
-              <a:shade val="50000"/>
-            </a:schemeClr>
-          </a:lnRef>
-          <a:fillRef idx="1">
-            <a:schemeClr val="accent1"/>
-          </a:fillRef>
-          <a:effectRef idx="0">
-            <a:schemeClr val="accent1"/>
-          </a:effectRef>
-          <a:fontRef idx="minor">
-            <a:schemeClr val="lt1"/>
-          </a:fontRef>
-        </p:style>
-        <p:txBody>
-          <a:bodyPr rtlCol="0" anchor="ctr"/>
-          <a:lstStyle/>
-          <a:p>
-            <a:pPr algn="ctr"/>
-            <a:endParaRPr lang="en-US"/>
-          </a:p>
-        </p:txBody>
-      </p:sp>
       <p:cxnSp>
         <p:nvCxnSpPr>
           <p:cNvPr id="123" name="Straight Connector 122"/>
           <p:cNvCxnSpPr>
-            <a:stCxn id="89" idx="2"/>
-            <a:endCxn id="119" idx="3"/>
+            <a:stCxn id="89" idx="4"/>
+            <a:endCxn id="119" idx="0"/>
           </p:cNvCxnSpPr>
           <p:nvPr/>
         </p:nvCxnSpPr>
         <p:spPr>
           <a:xfrm flipH="1">
-            <a:off x="6695091" y="3849167"/>
-            <a:ext cx="1411116" cy="225479"/>
+            <a:off x="7553395" y="4067647"/>
+            <a:ext cx="501169" cy="2577916"/>
           </a:xfrm>
           <a:prstGeom prst="line">
             <a:avLst/>
           </a:prstGeom>
-          <a:ln w="19050">
+          <a:ln w="19050" cmpd="sng">
             <a:solidFill>
-              <a:srgbClr val="929395"/>
+              <a:srgbClr val="004A8C"/>
             </a:solidFill>
           </a:ln>
         </p:spPr>
@@ -4148,7 +4172,7 @@
         </p:blipFill>
         <p:spPr>
           <a:xfrm>
-            <a:off x="4569823" y="4177017"/>
+            <a:off x="6254824" y="8516578"/>
             <a:ext cx="882944" cy="882944"/>
           </a:xfrm>
           <a:prstGeom prst="rect">
@@ -4164,7 +4188,7 @@
         </p:nvSpPr>
         <p:spPr>
           <a:xfrm>
-            <a:off x="2953470" y="10806529"/>
+            <a:off x="958120" y="7369179"/>
             <a:ext cx="2334467" cy="584775"/>
           </a:xfrm>
           <a:prstGeom prst="rect">
@@ -4193,7 +4217,7 @@
         </p:nvSpPr>
         <p:spPr>
           <a:xfrm>
-            <a:off x="3664244" y="9936095"/>
+            <a:off x="1761806" y="6592535"/>
             <a:ext cx="1504760" cy="584775"/>
           </a:xfrm>
           <a:prstGeom prst="rect">
@@ -4214,72 +4238,26 @@
           </a:p>
         </p:txBody>
       </p:sp>
-      <p:sp>
-        <p:nvSpPr>
-          <p:cNvPr id="141" name="Rectangle 140"/>
-          <p:cNvSpPr/>
-          <p:nvPr/>
-        </p:nvSpPr>
-        <p:spPr>
-          <a:xfrm>
-            <a:off x="2324394" y="10094357"/>
-            <a:ext cx="3207227" cy="1265733"/>
-          </a:xfrm>
-          <a:prstGeom prst="rect">
-            <a:avLst/>
-          </a:prstGeom>
-          <a:noFill/>
-          <a:ln w="15875">
-            <a:solidFill>
-              <a:srgbClr val="929395"/>
-            </a:solidFill>
-          </a:ln>
-        </p:spPr>
-        <p:style>
-          <a:lnRef idx="2">
-            <a:schemeClr val="accent1">
-              <a:shade val="50000"/>
-            </a:schemeClr>
-          </a:lnRef>
-          <a:fillRef idx="1">
-            <a:schemeClr val="accent1"/>
-          </a:fillRef>
-          <a:effectRef idx="0">
-            <a:schemeClr val="accent1"/>
-          </a:effectRef>
-          <a:fontRef idx="minor">
-            <a:schemeClr val="lt1"/>
-          </a:fontRef>
-        </p:style>
-        <p:txBody>
-          <a:bodyPr rtlCol="0" anchor="ctr"/>
-          <a:lstStyle/>
-          <a:p>
-            <a:pPr algn="ctr"/>
-            <a:endParaRPr lang="en-US"/>
-          </a:p>
-        </p:txBody>
-      </p:sp>
       <p:cxnSp>
         <p:nvCxnSpPr>
           <p:cNvPr id="157" name="Straight Connector 156"/>
           <p:cNvCxnSpPr>
-            <a:stCxn id="141" idx="1"/>
-            <a:endCxn id="1040" idx="5"/>
+            <a:stCxn id="141" idx="2"/>
+            <a:endCxn id="1040" idx="0"/>
           </p:cNvCxnSpPr>
           <p:nvPr/>
         </p:nvCxnSpPr>
         <p:spPr>
-          <a:xfrm flipH="1" flipV="1">
-            <a:off x="1667816" y="10567273"/>
-            <a:ext cx="656578" cy="159951"/>
+          <a:xfrm flipH="1">
+            <a:off x="1529407" y="7922740"/>
+            <a:ext cx="403251" cy="2496428"/>
           </a:xfrm>
           <a:prstGeom prst="line">
             <a:avLst/>
           </a:prstGeom>
           <a:ln w="19050">
             <a:solidFill>
-              <a:srgbClr val="929395"/>
+              <a:srgbClr val="004A8C"/>
             </a:solidFill>
           </a:ln>
         </p:spPr>
@@ -4320,7 +4298,7 @@
         </p:blipFill>
         <p:spPr>
           <a:xfrm>
-            <a:off x="5595850" y="3014539"/>
+            <a:off x="8026998" y="8410517"/>
             <a:ext cx="1017854" cy="883218"/>
           </a:xfrm>
           <a:prstGeom prst="rect">
@@ -4328,6 +4306,81 @@
           </a:prstGeom>
         </p:spPr>
       </p:pic>
+      <p:sp>
+        <p:nvSpPr>
+          <p:cNvPr id="86" name="TextBox 85"/>
+          <p:cNvSpPr txBox="1"/>
+          <p:nvPr/>
+        </p:nvSpPr>
+        <p:spPr>
+          <a:xfrm>
+            <a:off x="484632" y="2159319"/>
+            <a:ext cx="8586952" cy="400110"/>
+          </a:xfrm>
+          <a:prstGeom prst="rect">
+            <a:avLst/>
+          </a:prstGeom>
+          <a:noFill/>
+        </p:spPr>
+        <p:txBody>
+          <a:bodyPr wrap="square" rtlCol="0" anchor="ctr" anchorCtr="0">
+            <a:spAutoFit/>
+          </a:bodyPr>
+          <a:lstStyle/>
+          <a:p>
+            <a:pPr algn="ctr"/>
+            <a:r>
+              <a:rPr lang="de-DE" sz="2000" dirty="0" smtClean="0">
+                <a:solidFill>
+                  <a:srgbClr val="004A8C"/>
+                </a:solidFill>
+              </a:rPr>
+              <a:t>Innovation im Container Umfeld – Konkurrenz und aktuelle Problemlösungen</a:t>
+            </a:r>
+            <a:endParaRPr lang="en-US" sz="2000" dirty="0">
+              <a:solidFill>
+                <a:srgbClr val="004A8C"/>
+              </a:solidFill>
+            </a:endParaRPr>
+          </a:p>
+        </p:txBody>
+      </p:sp>
+      <p:cxnSp>
+        <p:nvCxnSpPr>
+          <p:cNvPr id="91" name="Straight Connector 90"/>
+          <p:cNvCxnSpPr/>
+          <p:nvPr/>
+        </p:nvCxnSpPr>
+        <p:spPr>
+          <a:xfrm>
+            <a:off x="477922" y="11658959"/>
+            <a:ext cx="8686800" cy="0"/>
+          </a:xfrm>
+          <a:prstGeom prst="line">
+            <a:avLst/>
+          </a:prstGeom>
+          <a:ln w="6350">
+            <a:solidFill>
+              <a:srgbClr val="004A8C"/>
+            </a:solidFill>
+            <a:tailEnd type="triangle"/>
+          </a:ln>
+        </p:spPr>
+        <p:style>
+          <a:lnRef idx="1">
+            <a:schemeClr val="accent1"/>
+          </a:lnRef>
+          <a:fillRef idx="0">
+            <a:schemeClr val="accent1"/>
+          </a:fillRef>
+          <a:effectRef idx="0">
+            <a:schemeClr val="accent1"/>
+          </a:effectRef>
+          <a:fontRef idx="minor">
+            <a:schemeClr val="tx1"/>
+          </a:fontRef>
+        </p:style>
+      </p:cxnSp>
     </p:spTree>
     <p:extLst>
       <p:ext uri="{BB962C8B-B14F-4D97-AF65-F5344CB8AC3E}">

</xml_diff>